<commit_message>
Final Version with Labview
</commit_message>
<xml_diff>
--- a/domosync_presentation.pptx
+++ b/domosync_presentation.pptx
@@ -9977,6 +9977,19 @@
 <file path=ppt/slides/slide13.xml><?xml version="1.0" encoding="utf-8"?>
 <p:sld xmlns:a="http://schemas.openxmlformats.org/drawingml/2006/main" xmlns:r="http://schemas.openxmlformats.org/officeDocument/2006/relationships" xmlns:p="http://schemas.openxmlformats.org/presentationml/2006/main">
   <p:cSld>
+    <p:bg>
+      <p:bgPr>
+        <a:pattFill prst="pct80">
+          <a:fgClr>
+            <a:srgbClr val="99CCFF"/>
+          </a:fgClr>
+          <a:bgClr>
+            <a:schemeClr val="bg1"/>
+          </a:bgClr>
+        </a:pattFill>
+        <a:effectLst/>
+      </p:bgPr>
+    </p:bg>
     <p:spTree>
       <p:nvGrpSpPr>
         <p:cNvPr id="1" name=""/>
@@ -9993,10 +10006,10 @@
       </p:grpSpPr>
       <p:pic>
         <p:nvPicPr>
-          <p:cNvPr id="15" name="Imagen 14" descr="Una caja de cartón&#10;&#10;Descripción generada automáticamente con confianza baja">
-            <a:extLst>
-              <a:ext uri="{FF2B5EF4-FFF2-40B4-BE49-F238E27FC236}">
-                <a16:creationId xmlns:a16="http://schemas.microsoft.com/office/drawing/2014/main" id="{E8D84FFE-AE63-BD77-EB1C-CDDC6ECD2059}"/>
+          <p:cNvPr id="4" name="Imagen 3" descr="Texto, Pizarra&#10;&#10;Descripción generada automáticamente">
+            <a:extLst>
+              <a:ext uri="{FF2B5EF4-FFF2-40B4-BE49-F238E27FC236}">
+                <a16:creationId xmlns:a16="http://schemas.microsoft.com/office/drawing/2014/main" id="{AC08DCCA-0357-5278-96B5-6E440E66F388}"/>
               </a:ext>
             </a:extLst>
           </p:cNvPr>
@@ -10013,14 +10026,13 @@
               </a:ext>
             </a:extLst>
           </a:blip>
-          <a:stretch>
-            <a:fillRect/>
-          </a:stretch>
+          <a:srcRect/>
+          <a:stretch/>
         </p:blipFill>
         <p:spPr>
           <a:xfrm>
-            <a:off x="0" y="0"/>
-            <a:ext cx="12192000" cy="6858000"/>
+            <a:off x="0" y="1341439"/>
+            <a:ext cx="12192000" cy="4485874"/>
           </a:xfrm>
           <a:prstGeom prst="rect">
             <a:avLst/>
@@ -14537,6 +14549,14 @@
 </file>
 
 <file path=customXml/item1.xml><?xml version="1.0" encoding="utf-8"?>
+<p:properties xmlns:p="http://schemas.microsoft.com/office/2006/metadata/properties" xmlns:xsi="http://www.w3.org/2001/XMLSchema-instance" xmlns:pc="http://schemas.microsoft.com/office/infopath/2007/PartnerControls">
+  <documentManagement>
+    <MediaServiceKeyPoints xmlns="71af3243-3dd4-4a8d-8c0d-dd76da1f02a5" xsi:nil="true"/>
+  </documentManagement>
+</p:properties>
+</file>
+
+<file path=customXml/item2.xml><?xml version="1.0" encoding="utf-8"?>
 <ct:contentTypeSchema xmlns:ct="http://schemas.microsoft.com/office/2006/metadata/contentType" xmlns:ma="http://schemas.microsoft.com/office/2006/metadata/properties/metaAttributes" ct:_="" ma:_="" ma:contentTypeName="Document" ma:contentTypeID="0x01010079F111ED35F8CC479449609E8A0923A6" ma:contentTypeVersion="11" ma:contentTypeDescription="Create a new document." ma:contentTypeScope="" ma:versionID="9677210f24a1be23c92c90fd886aa0aa">
   <xsd:schema xmlns:xsd="http://www.w3.org/2001/XMLSchema" xmlns:xs="http://www.w3.org/2001/XMLSchema" xmlns:p="http://schemas.microsoft.com/office/2006/metadata/properties" xmlns:ns2="71af3243-3dd4-4a8d-8c0d-dd76da1f02a5" xmlns:ns3="16c05727-aa75-4e4a-9b5f-8a80a1165891" targetNamespace="http://schemas.microsoft.com/office/2006/metadata/properties" ma:root="true" ma:fieldsID="60e05723c5c1908df1a1a4ebf11d344e" ns2:_="" ns3:_="">
     <xsd:import namespace="71af3243-3dd4-4a8d-8c0d-dd76da1f02a5"/>
@@ -14747,14 +14767,6 @@
 </ct:contentTypeSchema>
 </file>
 
-<file path=customXml/item2.xml><?xml version="1.0" encoding="utf-8"?>
-<p:properties xmlns:p="http://schemas.microsoft.com/office/2006/metadata/properties" xmlns:xsi="http://www.w3.org/2001/XMLSchema-instance" xmlns:pc="http://schemas.microsoft.com/office/infopath/2007/PartnerControls">
-  <documentManagement>
-    <MediaServiceKeyPoints xmlns="71af3243-3dd4-4a8d-8c0d-dd76da1f02a5" xsi:nil="true"/>
-  </documentManagement>
-</p:properties>
-</file>
-
 <file path=customXml/item3.xml><?xml version="1.0" encoding="utf-8"?>
 <?mso-contentType ?>
 <FormTemplates xmlns="http://schemas.microsoft.com/sharepoint/v3/contenttype/forms">
@@ -14765,6 +14777,16 @@
 </file>
 
 <file path=customXml/itemProps1.xml><?xml version="1.0" encoding="utf-8"?>
+<ds:datastoreItem xmlns:ds="http://schemas.openxmlformats.org/officeDocument/2006/customXml" ds:itemID="{171946EF-A3EA-4ECB-8D9A-56C36FFF4075}">
+  <ds:schemaRefs>
+    <ds:schemaRef ds:uri="http://schemas.microsoft.com/office/2006/metadata/properties"/>
+    <ds:schemaRef ds:uri="http://schemas.microsoft.com/office/infopath/2007/PartnerControls"/>
+    <ds:schemaRef ds:uri="71af3243-3dd4-4a8d-8c0d-dd76da1f02a5"/>
+  </ds:schemaRefs>
+</ds:datastoreItem>
+</file>
+
+<file path=customXml/itemProps2.xml><?xml version="1.0" encoding="utf-8"?>
 <ds:datastoreItem xmlns:ds="http://schemas.openxmlformats.org/officeDocument/2006/customXml" ds:itemID="{FFDD087A-3273-4D74-8700-4C8E2BE507D4}">
   <ds:schemaRefs>
     <ds:schemaRef ds:uri="http://schemas.microsoft.com/office/2006/metadata/contentType"/>
@@ -14783,16 +14805,6 @@
 </ds:datastoreItem>
 </file>
 
-<file path=customXml/itemProps2.xml><?xml version="1.0" encoding="utf-8"?>
-<ds:datastoreItem xmlns:ds="http://schemas.openxmlformats.org/officeDocument/2006/customXml" ds:itemID="{171946EF-A3EA-4ECB-8D9A-56C36FFF4075}">
-  <ds:schemaRefs>
-    <ds:schemaRef ds:uri="http://schemas.microsoft.com/office/2006/metadata/properties"/>
-    <ds:schemaRef ds:uri="http://schemas.microsoft.com/office/infopath/2007/PartnerControls"/>
-    <ds:schemaRef ds:uri="71af3243-3dd4-4a8d-8c0d-dd76da1f02a5"/>
-  </ds:schemaRefs>
-</ds:datastoreItem>
-</file>
-
 <file path=customXml/itemProps3.xml><?xml version="1.0" encoding="utf-8"?>
 <ds:datastoreItem xmlns:ds="http://schemas.openxmlformats.org/officeDocument/2006/customXml" ds:itemID="{72DAF9E5-DED4-4A50-A81B-4CC218A03F2B}">
   <ds:schemaRefs>

</xml_diff>